<commit_message>
Update content names and urls in references
</commit_message>
<xml_diff>
--- a/for_presentation/pptx/AI Enrichment Overview (ja-jp).pptx
+++ b/for_presentation/pptx/AI Enrichment Overview (ja-jp).pptx
@@ -157,6 +157,105 @@
 </p:presentation>
 </file>
 
+<file path=ppt/revisionInfo.xml><?xml version="1.0" encoding="utf-8"?>
+<p1510:revInfo xmlns:a="http://schemas.openxmlformats.org/drawingml/2006/main" xmlns:r="http://schemas.openxmlformats.org/officeDocument/2006/relationships" xmlns:p1510="http://schemas.microsoft.com/office/powerpoint/2015/10/main">
+  <p1510:revLst>
+    <p1510:client id="{32F6B1D4-F2EA-D147-BC98-9CA7D4A35199}" v="3" dt="2023-01-18T08:51:37.977"/>
+  </p1510:revLst>
+</p1510:revInfo>
+</file>
+
+<file path=ppt/changesInfos/changesInfo1.xml><?xml version="1.0" encoding="utf-8"?>
+<pc:chgInfo xmlns:a="http://schemas.openxmlformats.org/drawingml/2006/main" xmlns:r="http://schemas.openxmlformats.org/officeDocument/2006/relationships" xmlns:ac="http://schemas.microsoft.com/office/drawing/2013/main/command" xmlns:pc="http://schemas.microsoft.com/office/powerpoint/2013/main/command">
+  <pc:docChgLst>
+    <pc:chgData name="Keisuke Takahashi" userId="a3db1eab-8987-4160-b949-372b06a7df04" providerId="ADAL" clId="{32F6B1D4-F2EA-D147-BC98-9CA7D4A35199}"/>
+    <pc:docChg chg="undo custSel modSld">
+      <pc:chgData name="Keisuke Takahashi" userId="a3db1eab-8987-4160-b949-372b06a7df04" providerId="ADAL" clId="{32F6B1D4-F2EA-D147-BC98-9CA7D4A35199}" dt="2023-01-18T08:53:07.119" v="198" actId="20577"/>
+      <pc:docMkLst>
+        <pc:docMk/>
+      </pc:docMkLst>
+      <pc:sldChg chg="addSp delSp modSp mod modNotesTx">
+        <pc:chgData name="Keisuke Takahashi" userId="a3db1eab-8987-4160-b949-372b06a7df04" providerId="ADAL" clId="{32F6B1D4-F2EA-D147-BC98-9CA7D4A35199}" dt="2023-01-18T08:53:07.119" v="198" actId="20577"/>
+        <pc:sldMkLst>
+          <pc:docMk/>
+          <pc:sldMk cId="172670671" sldId="2076136250"/>
+        </pc:sldMkLst>
+        <pc:spChg chg="mod">
+          <ac:chgData name="Keisuke Takahashi" userId="a3db1eab-8987-4160-b949-372b06a7df04" providerId="ADAL" clId="{32F6B1D4-F2EA-D147-BC98-9CA7D4A35199}" dt="2023-01-18T08:47:13.508" v="76" actId="20577"/>
+          <ac:spMkLst>
+            <pc:docMk/>
+            <pc:sldMk cId="172670671" sldId="2076136250"/>
+            <ac:spMk id="5" creationId="{0017443C-D526-49C2-9F5B-8E362D26B578}"/>
+          </ac:spMkLst>
+        </pc:spChg>
+        <pc:graphicFrameChg chg="add del">
+          <ac:chgData name="Keisuke Takahashi" userId="a3db1eab-8987-4160-b949-372b06a7df04" providerId="ADAL" clId="{32F6B1D4-F2EA-D147-BC98-9CA7D4A35199}" dt="2023-01-18T08:52:15.539" v="115" actId="3680"/>
+          <ac:graphicFrameMkLst>
+            <pc:docMk/>
+            <pc:sldMk cId="172670671" sldId="2076136250"/>
+            <ac:graphicFrameMk id="4" creationId="{51AA62BF-BFBF-06E1-4FFC-E5EEDAFF5F64}"/>
+          </ac:graphicFrameMkLst>
+        </pc:graphicFrameChg>
+      </pc:sldChg>
+      <pc:sldChg chg="modSp mod">
+        <pc:chgData name="Keisuke Takahashi" userId="a3db1eab-8987-4160-b949-372b06a7df04" providerId="ADAL" clId="{32F6B1D4-F2EA-D147-BC98-9CA7D4A35199}" dt="2023-01-18T08:50:08.086" v="111"/>
+        <pc:sldMkLst>
+          <pc:docMk/>
+          <pc:sldMk cId="1857195784" sldId="2076136311"/>
+        </pc:sldMkLst>
+        <pc:spChg chg="mod">
+          <ac:chgData name="Keisuke Takahashi" userId="a3db1eab-8987-4160-b949-372b06a7df04" providerId="ADAL" clId="{32F6B1D4-F2EA-D147-BC98-9CA7D4A35199}" dt="2023-01-18T08:48:15.999" v="93" actId="6549"/>
+          <ac:spMkLst>
+            <pc:docMk/>
+            <pc:sldMk cId="1857195784" sldId="2076136311"/>
+            <ac:spMk id="7" creationId="{9575B390-DBCB-A549-704A-07BC53858581}"/>
+          </ac:spMkLst>
+        </pc:spChg>
+        <pc:spChg chg="mod">
+          <ac:chgData name="Keisuke Takahashi" userId="a3db1eab-8987-4160-b949-372b06a7df04" providerId="ADAL" clId="{32F6B1D4-F2EA-D147-BC98-9CA7D4A35199}" dt="2023-01-18T08:49:37.728" v="107" actId="1076"/>
+          <ac:spMkLst>
+            <pc:docMk/>
+            <pc:sldMk cId="1857195784" sldId="2076136311"/>
+            <ac:spMk id="9" creationId="{AD9E62EB-1761-1952-3F52-99D8365E6C97}"/>
+          </ac:spMkLst>
+        </pc:spChg>
+        <pc:spChg chg="mod">
+          <ac:chgData name="Keisuke Takahashi" userId="a3db1eab-8987-4160-b949-372b06a7df04" providerId="ADAL" clId="{32F6B1D4-F2EA-D147-BC98-9CA7D4A35199}" dt="2023-01-18T08:50:08.086" v="111"/>
+          <ac:spMkLst>
+            <pc:docMk/>
+            <pc:sldMk cId="1857195784" sldId="2076136311"/>
+            <ac:spMk id="10" creationId="{3D55D034-4FF1-C941-CAA6-CFB3808A6A44}"/>
+          </ac:spMkLst>
+        </pc:spChg>
+        <pc:spChg chg="mod">
+          <ac:chgData name="Keisuke Takahashi" userId="a3db1eab-8987-4160-b949-372b06a7df04" providerId="ADAL" clId="{32F6B1D4-F2EA-D147-BC98-9CA7D4A35199}" dt="2023-01-18T08:49:52.865" v="110"/>
+          <ac:spMkLst>
+            <pc:docMk/>
+            <pc:sldMk cId="1857195784" sldId="2076136311"/>
+            <ac:spMk id="12" creationId="{0148BCF9-1D13-9533-45B6-16546B1FF79D}"/>
+          </ac:spMkLst>
+        </pc:spChg>
+      </pc:sldChg>
+      <pc:sldChg chg="modSp mod">
+        <pc:chgData name="Keisuke Takahashi" userId="a3db1eab-8987-4160-b949-372b06a7df04" providerId="ADAL" clId="{32F6B1D4-F2EA-D147-BC98-9CA7D4A35199}" dt="2023-01-18T08:50:31.940" v="112"/>
+        <pc:sldMkLst>
+          <pc:docMk/>
+          <pc:sldMk cId="3160021953" sldId="2076136312"/>
+        </pc:sldMkLst>
+        <pc:spChg chg="mod">
+          <ac:chgData name="Keisuke Takahashi" userId="a3db1eab-8987-4160-b949-372b06a7df04" providerId="ADAL" clId="{32F6B1D4-F2EA-D147-BC98-9CA7D4A35199}" dt="2023-01-18T08:50:31.940" v="112"/>
+          <ac:spMkLst>
+            <pc:docMk/>
+            <pc:sldMk cId="3160021953" sldId="2076136312"/>
+            <ac:spMk id="10" creationId="{3D55D034-4FF1-C941-CAA6-CFB3808A6A44}"/>
+          </ac:spMkLst>
+        </pc:spChg>
+      </pc:sldChg>
+    </pc:docChg>
+  </pc:docChgLst>
+</pc:chgInfo>
+</file>
+
 <file path=ppt/handoutMasters/handoutMaster1.xml><?xml version="1.0" encoding="utf-8"?>
 <p:handoutMaster xmlns:a="http://schemas.openxmlformats.org/drawingml/2006/main" xmlns:r="http://schemas.openxmlformats.org/officeDocument/2006/relationships" xmlns:p="http://schemas.openxmlformats.org/presentationml/2006/main">
   <p:cSld>
@@ -251,7 +350,7 @@
           <a:p>
             <a:fld id="{5DC6FE6B-C416-4AB4-9C30-FB2A7099CAC6}" type="datetimeFigureOut">
               <a:rPr lang="en-US" smtClean="0"/>
-              <a:t>6/16/22</a:t>
+              <a:t>1/18/23</a:t>
             </a:fld>
             <a:endParaRPr lang="en-US"/>
           </a:p>
@@ -428,7 +527,7 @@
           <a:p>
             <a:fld id="{CFF76AD5-84B7-47FE-802A-FFAE792CDC84}" type="datetimeFigureOut">
               <a:rPr lang="en-US" smtClean="0"/>
-              <a:t>6/16/22</a:t>
+              <a:t>1/18/23</a:t>
             </a:fld>
             <a:endParaRPr lang="en-US"/>
           </a:p>
@@ -696,6 +795,147 @@
 </file>
 
 <file path=ppt/notesSlides/notesSlide1.xml><?xml version="1.0" encoding="utf-8"?>
+<p:notes xmlns:a="http://schemas.openxmlformats.org/drawingml/2006/main" xmlns:r="http://schemas.openxmlformats.org/officeDocument/2006/relationships" xmlns:p="http://schemas.openxmlformats.org/presentationml/2006/main">
+  <p:cSld>
+    <p:spTree>
+      <p:nvGrpSpPr>
+        <p:cNvPr id="1" name=""/>
+        <p:cNvGrpSpPr/>
+        <p:nvPr/>
+      </p:nvGrpSpPr>
+      <p:grpSpPr>
+        <a:xfrm>
+          <a:off x="0" y="0"/>
+          <a:ext cx="0" cy="0"/>
+          <a:chOff x="0" y="0"/>
+          <a:chExt cx="0" cy="0"/>
+        </a:xfrm>
+      </p:grpSpPr>
+      <p:sp>
+        <p:nvSpPr>
+          <p:cNvPr id="2" name="Slide Image Placeholder 1"/>
+          <p:cNvSpPr>
+            <a:spLocks noGrp="1" noRot="1" noChangeAspect="1"/>
+          </p:cNvSpPr>
+          <p:nvPr>
+            <p:ph type="sldImg"/>
+          </p:nvPr>
+        </p:nvSpPr>
+        <p:spPr/>
+      </p:sp>
+      <p:sp>
+        <p:nvSpPr>
+          <p:cNvPr id="3" name="Notes Placeholder 2"/>
+          <p:cNvSpPr>
+            <a:spLocks noGrp="1"/>
+          </p:cNvSpPr>
+          <p:nvPr>
+            <p:ph type="body" idx="1"/>
+          </p:nvPr>
+        </p:nvSpPr>
+        <p:spPr/>
+        <p:txBody>
+          <a:bodyPr/>
+          <a:lstStyle/>
+          <a:p>
+            <a:r>
+              <a:rPr lang="ja-JP" altLang="en-US"/>
+              <a:t>改訂履歴</a:t>
+            </a:r>
+            <a:endParaRPr lang="en-JP" altLang="ja-JP" dirty="0"/>
+          </a:p>
+          <a:p>
+            <a:r>
+              <a:rPr lang="en-US" altLang="ja-JP" dirty="0"/>
+              <a:t>2022/06 | v1.0.0 | </a:t>
+            </a:r>
+            <a:r>
+              <a:rPr lang="ja-JP" altLang="en-US"/>
+              <a:t>初版</a:t>
+            </a:r>
+            <a:r>
+              <a:rPr lang="en-US" altLang="ja-JP" dirty="0"/>
+              <a:t> |</a:t>
+            </a:r>
+          </a:p>
+          <a:p>
+            <a:r>
+              <a:rPr lang="en-US" altLang="ja-JP" dirty="0"/>
+              <a:t>2023/01 | v1.0.1 | Docs</a:t>
+            </a:r>
+            <a:r>
+              <a:rPr lang="ja-JP" altLang="en-US"/>
+              <a:t>等の名称および</a:t>
+            </a:r>
+            <a:r>
+              <a:rPr lang="en-US" altLang="ja-JP" dirty="0"/>
+              <a:t>URL</a:t>
+            </a:r>
+            <a:r>
+              <a:rPr lang="ja-JP" altLang="en-US"/>
+              <a:t>を</a:t>
+            </a:r>
+            <a:r>
+              <a:rPr lang="en-US" altLang="ja-JP" dirty="0"/>
+              <a:t>Learn</a:t>
+            </a:r>
+            <a:r>
+              <a:rPr lang="ja-JP" altLang="en-US"/>
+              <a:t>のものに変更</a:t>
+            </a:r>
+            <a:r>
+              <a:rPr lang="en-US" altLang="ja-JP" dirty="0"/>
+              <a:t> |</a:t>
+            </a:r>
+          </a:p>
+          <a:p>
+            <a:endParaRPr lang="en-US" altLang="ja-JP" dirty="0"/>
+          </a:p>
+          <a:p>
+            <a:endParaRPr lang="en-US" altLang="ja-JP" dirty="0"/>
+          </a:p>
+          <a:p>
+            <a:endParaRPr lang="en-JP" dirty="0"/>
+          </a:p>
+        </p:txBody>
+      </p:sp>
+      <p:sp>
+        <p:nvSpPr>
+          <p:cNvPr id="4" name="Slide Number Placeholder 3"/>
+          <p:cNvSpPr>
+            <a:spLocks noGrp="1"/>
+          </p:cNvSpPr>
+          <p:nvPr>
+            <p:ph type="sldNum" sz="quarter" idx="5"/>
+          </p:nvPr>
+        </p:nvSpPr>
+        <p:spPr/>
+        <p:txBody>
+          <a:bodyPr/>
+          <a:lstStyle/>
+          <a:p>
+            <a:fld id="{CCB0B7A7-645F-45EF-A82D-25C8E51FB344}" type="slidenum">
+              <a:rPr lang="en-US" smtClean="0"/>
+              <a:t>1</a:t>
+            </a:fld>
+            <a:endParaRPr lang="en-US"/>
+          </a:p>
+        </p:txBody>
+      </p:sp>
+    </p:spTree>
+    <p:extLst>
+      <p:ext uri="{BB962C8B-B14F-4D97-AF65-F5344CB8AC3E}">
+        <p14:creationId xmlns:p14="http://schemas.microsoft.com/office/powerpoint/2010/main" val="3456732583"/>
+      </p:ext>
+    </p:extLst>
+  </p:cSld>
+  <p:clrMapOvr>
+    <a:masterClrMapping/>
+  </p:clrMapOvr>
+</p:notes>
+</file>
+
+<file path=ppt/notesSlides/notesSlide2.xml><?xml version="1.0" encoding="utf-8"?>
 <p:notes xmlns:a="http://schemas.openxmlformats.org/drawingml/2006/main" xmlns:r="http://schemas.openxmlformats.org/officeDocument/2006/relationships" xmlns:p="http://schemas.openxmlformats.org/presentationml/2006/main">
   <p:cSld>
     <p:spTree>
@@ -6750,7 +6990,7 @@
           <a:p>
             <a:fld id="{E99080E2-161E-4461-9006-6F8BF1776BE3}" type="datetime1">
               <a:rPr lang="en-US" smtClean="0"/>
-              <a:t>6/16/22</a:t>
+              <a:t>1/18/23</a:t>
             </a:fld>
             <a:endParaRPr lang="en-US"/>
           </a:p>
@@ -6863,7 +7103,7 @@
           <a:p>
             <a:fld id="{643E9E83-8A79-40C0-9FE5-E30ED9EDC2DE}" type="datetime1">
               <a:rPr lang="en-US" smtClean="0"/>
-              <a:t>6/16/22</a:t>
+              <a:t>1/18/23</a:t>
             </a:fld>
             <a:endParaRPr lang="en-US"/>
           </a:p>
@@ -10896,7 +11136,7 @@
           <a:p>
             <a:r>
               <a:rPr lang="en-US" dirty="0"/>
-              <a:t>Jun 2022</a:t>
+              <a:t>Jan 2023</a:t>
             </a:r>
           </a:p>
         </p:txBody>
@@ -10916,7 +11156,7 @@
           <p:nvPr/>
         </p:nvPicPr>
         <p:blipFill>
-          <a:blip r:embed="rId2"/>
+          <a:blip r:embed="rId3"/>
           <a:stretch>
             <a:fillRect/>
           </a:stretch>
@@ -17717,7 +17957,7 @@
         <p:spPr>
           <a:xfrm>
             <a:off x="2361788" y="5609967"/>
-            <a:ext cx="1703800" cy="307777"/>
+            <a:ext cx="1765804" cy="307777"/>
           </a:xfrm>
           <a:prstGeom prst="rect">
             <a:avLst/>
@@ -17735,7 +17975,7 @@
               <a:rPr lang="en-JP" sz="2000" dirty="0">
                 <a:hlinkClick r:id="rId4"/>
               </a:rPr>
-              <a:t>Microsoft Docs</a:t>
+              <a:t>Microsoft Learn</a:t>
             </a:r>
             <a:endParaRPr lang="en-JP" sz="2000" dirty="0"/>
           </a:p>
@@ -17755,8 +17995,8 @@
         </p:nvSpPr>
         <p:spPr>
           <a:xfrm>
-            <a:off x="8128000" y="5609967"/>
-            <a:ext cx="1765804" cy="307777"/>
+            <a:off x="7796043" y="5609967"/>
+            <a:ext cx="2867195" cy="307777"/>
           </a:xfrm>
           <a:prstGeom prst="rect">
             <a:avLst/>
@@ -17774,7 +18014,7 @@
               <a:rPr lang="en-JP" sz="2000" dirty="0">
                 <a:hlinkClick r:id="rId5"/>
               </a:rPr>
-              <a:t>Microsoft Learn</a:t>
+              <a:t>Training | Microsoft Learn</a:t>
             </a:r>
             <a:endParaRPr lang="en-JP" sz="2000" dirty="0"/>
           </a:p>
@@ -17783,7 +18023,7 @@
       <p:sp>
         <p:nvSpPr>
           <p:cNvPr id="10" name="TextBox 9">
-            <a:hlinkClick r:id="rId4"/>
+            <a:hlinkClick r:id="rId6"/>
             <a:extLst>
               <a:ext uri="{FF2B5EF4-FFF2-40B4-BE49-F238E27FC236}">
                 <a16:creationId xmlns:a16="http://schemas.microsoft.com/office/drawing/2014/main" id="{3D55D034-4FF1-C941-CAA6-CFB3808A6A44}"/>
@@ -17816,7 +18056,7 @@
             </a:r>
             <a:r>
               <a:rPr lang="en-US" sz="1000" dirty="0" err="1"/>
-              <a:t>docs.microsoft.com</a:t>
+              <a:t>learn.microsoft.com</a:t>
             </a:r>
             <a:r>
               <a:rPr lang="en-US" sz="1000" dirty="0"/>
@@ -17837,7 +18077,7 @@
       <p:sp>
         <p:nvSpPr>
           <p:cNvPr id="12" name="TextBox 11">
-            <a:hlinkClick r:id="rId5"/>
+            <a:hlinkClick r:id="rId7"/>
             <a:extLst>
               <a:ext uri="{FF2B5EF4-FFF2-40B4-BE49-F238E27FC236}">
                 <a16:creationId xmlns:a16="http://schemas.microsoft.com/office/drawing/2014/main" id="{0148BCF9-1D13-9533-45B6-16546B1FF79D}"/>
@@ -17850,7 +18090,7 @@
         <p:spPr>
           <a:xfrm>
             <a:off x="6176793" y="5964367"/>
-            <a:ext cx="5668218" cy="153888"/>
+            <a:ext cx="5838137" cy="153888"/>
           </a:xfrm>
           <a:prstGeom prst="rect">
             <a:avLst/>
@@ -17870,7 +18110,7 @@
             </a:r>
             <a:r>
               <a:rPr lang="en-US" sz="1000" dirty="0" err="1"/>
-              <a:t>docs.microsoft.com</a:t>
+              <a:t>learn.microsoft.com</a:t>
             </a:r>
             <a:r>
               <a:rPr lang="en-US" sz="1000" dirty="0"/>
@@ -17882,7 +18122,7 @@
             </a:r>
             <a:r>
               <a:rPr lang="en-US" sz="1000" dirty="0"/>
-              <a:t>/learn/paths/implement-knowledge-mining-azure-cognitive-search/</a:t>
+              <a:t>/training/paths/implement-knowledge-mining-azure-cognitive-search/</a:t>
             </a:r>
             <a:endParaRPr lang="en-JP" sz="1000" dirty="0"/>
           </a:p>
@@ -18241,7 +18481,7 @@
             </a:r>
             <a:r>
               <a:rPr lang="en-US" sz="1000" dirty="0" err="1"/>
-              <a:t>docs.microsoft.com</a:t>
+              <a:t>learn.microsoft.com</a:t>
             </a:r>
             <a:r>
               <a:rPr lang="en-US" sz="1000" dirty="0"/>
@@ -38092,6 +38332,15 @@
 </file>
 
 <file path=customXml/item1.xml><?xml version="1.0" encoding="utf-8"?>
+<?mso-contentType ?>
+<FormTemplates xmlns="http://schemas.microsoft.com/sharepoint/v3/contenttype/forms">
+  <Display>DocumentLibraryForm</Display>
+  <Edit>DocumentLibraryForm</Edit>
+  <New>DocumentLibraryForm</New>
+</FormTemplates>
+</file>
+
+<file path=customXml/item2.xml><?xml version="1.0" encoding="utf-8"?>
 <ct:contentTypeSchema xmlns:ct="http://schemas.microsoft.com/office/2006/metadata/contentType" xmlns:ma="http://schemas.microsoft.com/office/2006/metadata/properties/metaAttributes" ct:_="" ma:_="" ma:contentTypeName="Document" ma:contentTypeID="0x010100CE455F045A702B43A89D5A0339E9F97B" ma:contentTypeVersion="12" ma:contentTypeDescription="Create a new document." ma:contentTypeScope="" ma:versionID="8e225f2e20b7588b200aa1b84c7504b2">
   <xsd:schema xmlns:xsd="http://www.w3.org/2001/XMLSchema" xmlns:xs="http://www.w3.org/2001/XMLSchema" xmlns:p="http://schemas.microsoft.com/office/2006/metadata/properties" xmlns:ns1="http://schemas.microsoft.com/sharepoint/v3" xmlns:ns2="0f9a40fa-41d0-4ce5-a6b6-a7c54486888a" xmlns:ns3="0095a4c3-e312-41d4-9500-6ea0e1763538" targetNamespace="http://schemas.microsoft.com/office/2006/metadata/properties" ma:root="true" ma:fieldsID="a6e791aef2caf1c48ba26f5b04816033" ns1:_="" ns2:_="" ns3:_="">
     <xsd:import namespace="http://schemas.microsoft.com/sharepoint/v3"/>
@@ -38299,15 +38548,6 @@
 </ct:contentTypeSchema>
 </file>
 
-<file path=customXml/item2.xml><?xml version="1.0" encoding="utf-8"?>
-<?mso-contentType ?>
-<FormTemplates xmlns="http://schemas.microsoft.com/sharepoint/v3/contenttype/forms">
-  <Display>DocumentLibraryForm</Display>
-  <Edit>DocumentLibraryForm</Edit>
-  <New>DocumentLibraryForm</New>
-</FormTemplates>
-</file>
-
 <file path=customXml/item3.xml><?xml version="1.0" encoding="utf-8"?>
 <p:properties xmlns:p="http://schemas.microsoft.com/office/2006/metadata/properties" xmlns:xsi="http://www.w3.org/2001/XMLSchema-instance" xmlns:pc="http://schemas.microsoft.com/office/infopath/2007/PartnerControls">
   <documentManagement>
@@ -38323,6 +38563,14 @@
 </file>
 
 <file path=customXml/itemProps1.xml><?xml version="1.0" encoding="utf-8"?>
+<ds:datastoreItem xmlns:ds="http://schemas.openxmlformats.org/officeDocument/2006/customXml" ds:itemID="{91696345-23F8-4CDB-8A31-BEF0BEB16805}">
+  <ds:schemaRefs>
+    <ds:schemaRef ds:uri="http://schemas.microsoft.com/sharepoint/v3/contenttype/forms"/>
+  </ds:schemaRefs>
+</ds:datastoreItem>
+</file>
+
+<file path=customXml/itemProps2.xml><?xml version="1.0" encoding="utf-8"?>
 <ds:datastoreItem xmlns:ds="http://schemas.openxmlformats.org/officeDocument/2006/customXml" ds:itemID="{A92A7216-474B-4895-A483-BCB296A7BC61}">
   <ds:schemaRefs>
     <ds:schemaRef ds:uri="http://schemas.microsoft.com/office/2006/metadata/contentType"/>
@@ -38342,30 +38590,20 @@
 </ds:datastoreItem>
 </file>
 
-<file path=customXml/itemProps2.xml><?xml version="1.0" encoding="utf-8"?>
-<ds:datastoreItem xmlns:ds="http://schemas.openxmlformats.org/officeDocument/2006/customXml" ds:itemID="{91696345-23F8-4CDB-8A31-BEF0BEB16805}">
-  <ds:schemaRefs>
-    <ds:schemaRef ds:uri="http://schemas.microsoft.com/sharepoint/v3/contenttype/forms"/>
-  </ds:schemaRefs>
-</ds:datastoreItem>
-</file>
-
 <file path=customXml/itemProps3.xml><?xml version="1.0" encoding="utf-8"?>
 <ds:datastoreItem xmlns:ds="http://schemas.openxmlformats.org/officeDocument/2006/customXml" ds:itemID="{0A9086BA-F6B1-41F0-8458-5D968EBBF04E}">
   <ds:schemaRefs>
     <ds:schemaRef ds:uri="http://schemas.microsoft.com/office/2006/metadata/properties"/>
+    <ds:schemaRef ds:uri="http://schemas.openxmlformats.org/package/2006/metadata/core-properties"/>
+    <ds:schemaRef ds:uri="http://purl.org/dc/terms/"/>
+    <ds:schemaRef ds:uri="http://schemas.microsoft.com/office/infopath/2007/PartnerControls"/>
     <ds:schemaRef ds:uri="http://purl.org/dc/elements/1.1/"/>
     <ds:schemaRef ds:uri="http://purl.org/dc/dcmitype/"/>
+    <ds:schemaRef ds:uri="http://schemas.microsoft.com/office/2006/documentManagement/types"/>
+    <ds:schemaRef ds:uri="0095a4c3-e312-41d4-9500-6ea0e1763538"/>
+    <ds:schemaRef ds:uri="0f9a40fa-41d0-4ce5-a6b6-a7c54486888a"/>
+    <ds:schemaRef ds:uri="http://schemas.microsoft.com/sharepoint/v3"/>
     <ds:schemaRef ds:uri="http://www.w3.org/XML/1998/namespace"/>
-    <ds:schemaRef ds:uri="http://schemas.microsoft.com/sharepoint/v3"/>
-    <ds:schemaRef ds:uri="4343a8c8-d2d9-429e-8dd3-28f02b2ba4f5"/>
-    <ds:schemaRef ds:uri="http://schemas.microsoft.com/office/2006/documentManagement/types"/>
-    <ds:schemaRef ds:uri="http://schemas.microsoft.com/office/infopath/2007/PartnerControls"/>
-    <ds:schemaRef ds:uri="http://schemas.openxmlformats.org/package/2006/metadata/core-properties"/>
-    <ds:schemaRef ds:uri="675661ce-a921-4ef4-be83-dd19f3c4cc86"/>
-    <ds:schemaRef ds:uri="http://purl.org/dc/terms/"/>
-    <ds:schemaRef ds:uri="0f9a40fa-41d0-4ce5-a6b6-a7c54486888a"/>
-    <ds:schemaRef ds:uri="0095a4c3-e312-41d4-9500-6ea0e1763538"/>
   </ds:schemaRefs>
 </ds:datastoreItem>
 </file>

</xml_diff>